<commit_message>
various updates and fixes after end user tests, deployment tests, code review
</commit_message>
<xml_diff>
--- a/doc/architecture.pptx
+++ b/doc/architecture.pptx
@@ -259,7 +259,7 @@
           <a:p>
             <a:fld id="{01203782-5ABD-42F9-AD1F-69C535680286}" type="datetimeFigureOut">
               <a:rPr lang="en-US" smtClean="0"/>
-              <a:t>3/5/2024</a:t>
+              <a:t>5/23/24</a:t>
             </a:fld>
             <a:endParaRPr lang="en-US"/>
           </a:p>
@@ -457,7 +457,7 @@
           <a:p>
             <a:fld id="{01203782-5ABD-42F9-AD1F-69C535680286}" type="datetimeFigureOut">
               <a:rPr lang="en-US" smtClean="0"/>
-              <a:t>3/5/2024</a:t>
+              <a:t>5/23/24</a:t>
             </a:fld>
             <a:endParaRPr lang="en-US"/>
           </a:p>
@@ -665,7 +665,7 @@
           <a:p>
             <a:fld id="{01203782-5ABD-42F9-AD1F-69C535680286}" type="datetimeFigureOut">
               <a:rPr lang="en-US" smtClean="0"/>
-              <a:t>3/5/2024</a:t>
+              <a:t>5/23/24</a:t>
             </a:fld>
             <a:endParaRPr lang="en-US"/>
           </a:p>
@@ -863,7 +863,7 @@
           <a:p>
             <a:fld id="{01203782-5ABD-42F9-AD1F-69C535680286}" type="datetimeFigureOut">
               <a:rPr lang="en-US" smtClean="0"/>
-              <a:t>3/5/2024</a:t>
+              <a:t>5/23/24</a:t>
             </a:fld>
             <a:endParaRPr lang="en-US"/>
           </a:p>
@@ -1138,7 +1138,7 @@
           <a:p>
             <a:fld id="{01203782-5ABD-42F9-AD1F-69C535680286}" type="datetimeFigureOut">
               <a:rPr lang="en-US" smtClean="0"/>
-              <a:t>3/5/2024</a:t>
+              <a:t>5/23/24</a:t>
             </a:fld>
             <a:endParaRPr lang="en-US"/>
           </a:p>
@@ -1403,7 +1403,7 @@
           <a:p>
             <a:fld id="{01203782-5ABD-42F9-AD1F-69C535680286}" type="datetimeFigureOut">
               <a:rPr lang="en-US" smtClean="0"/>
-              <a:t>3/5/2024</a:t>
+              <a:t>5/23/24</a:t>
             </a:fld>
             <a:endParaRPr lang="en-US"/>
           </a:p>
@@ -1815,7 +1815,7 @@
           <a:p>
             <a:fld id="{01203782-5ABD-42F9-AD1F-69C535680286}" type="datetimeFigureOut">
               <a:rPr lang="en-US" smtClean="0"/>
-              <a:t>3/5/2024</a:t>
+              <a:t>5/23/24</a:t>
             </a:fld>
             <a:endParaRPr lang="en-US"/>
           </a:p>
@@ -1956,7 +1956,7 @@
           <a:p>
             <a:fld id="{01203782-5ABD-42F9-AD1F-69C535680286}" type="datetimeFigureOut">
               <a:rPr lang="en-US" smtClean="0"/>
-              <a:t>3/5/2024</a:t>
+              <a:t>5/23/24</a:t>
             </a:fld>
             <a:endParaRPr lang="en-US"/>
           </a:p>
@@ -2069,7 +2069,7 @@
           <a:p>
             <a:fld id="{01203782-5ABD-42F9-AD1F-69C535680286}" type="datetimeFigureOut">
               <a:rPr lang="en-US" smtClean="0"/>
-              <a:t>3/5/2024</a:t>
+              <a:t>5/23/24</a:t>
             </a:fld>
             <a:endParaRPr lang="en-US"/>
           </a:p>
@@ -2380,7 +2380,7 @@
           <a:p>
             <a:fld id="{01203782-5ABD-42F9-AD1F-69C535680286}" type="datetimeFigureOut">
               <a:rPr lang="en-US" smtClean="0"/>
-              <a:t>3/5/2024</a:t>
+              <a:t>5/23/24</a:t>
             </a:fld>
             <a:endParaRPr lang="en-US"/>
           </a:p>
@@ -2668,7 +2668,7 @@
           <a:p>
             <a:fld id="{01203782-5ABD-42F9-AD1F-69C535680286}" type="datetimeFigureOut">
               <a:rPr lang="en-US" smtClean="0"/>
-              <a:t>3/5/2024</a:t>
+              <a:t>5/23/24</a:t>
             </a:fld>
             <a:endParaRPr lang="en-US"/>
           </a:p>
@@ -2909,7 +2909,7 @@
           <a:p>
             <a:fld id="{01203782-5ABD-42F9-AD1F-69C535680286}" type="datetimeFigureOut">
               <a:rPr lang="en-US" smtClean="0"/>
-              <a:t>3/5/2024</a:t>
+              <a:t>5/23/24</a:t>
             </a:fld>
             <a:endParaRPr lang="en-US"/>
           </a:p>
@@ -3933,10 +3933,10 @@
       </p:sp>
       <p:grpSp>
         <p:nvGrpSpPr>
-          <p:cNvPr id="13" name="Group 12">
-            <a:extLst>
-              <a:ext uri="{FF2B5EF4-FFF2-40B4-BE49-F238E27FC236}">
-                <a16:creationId xmlns:a16="http://schemas.microsoft.com/office/drawing/2014/main" id="{C8130BB7-F175-4E6D-9C2D-5D46C462D477}"/>
+          <p:cNvPr id="34" name="Group 33">
+            <a:extLst>
+              <a:ext uri="{FF2B5EF4-FFF2-40B4-BE49-F238E27FC236}">
+                <a16:creationId xmlns:a16="http://schemas.microsoft.com/office/drawing/2014/main" id="{629CD5C4-ADD1-788D-0D17-8EE38D43459C}"/>
               </a:ext>
             </a:extLst>
           </p:cNvPr>
@@ -3945,18 +3945,18 @@
         </p:nvGrpSpPr>
         <p:grpSpPr>
           <a:xfrm>
-            <a:off x="6323134" y="4359554"/>
-            <a:ext cx="2243137" cy="692027"/>
-            <a:chOff x="5926932" y="2291679"/>
-            <a:chExt cx="2243137" cy="692027"/>
+            <a:off x="6323134" y="4354570"/>
+            <a:ext cx="2243137" cy="697011"/>
+            <a:chOff x="6323134" y="4354570"/>
+            <a:chExt cx="2243137" cy="697011"/>
           </a:xfrm>
         </p:grpSpPr>
         <p:pic>
           <p:nvPicPr>
-            <p:cNvPr id="11" name="Graphic 17">
+            <p:cNvPr id="24" name="Graphic 32">
               <a:extLst>
                 <a:ext uri="{FF2B5EF4-FFF2-40B4-BE49-F238E27FC236}">
-                  <a16:creationId xmlns:a16="http://schemas.microsoft.com/office/drawing/2014/main" id="{43517F58-A266-4459-92AD-CF927C4A4317}"/>
+                  <a16:creationId xmlns:a16="http://schemas.microsoft.com/office/drawing/2014/main" id="{9C173975-F948-7EFF-1AC4-F76869C68B49}"/>
                 </a:ext>
               </a:extLst>
             </p:cNvPr>
@@ -3978,7 +3978,7 @@
           </p:blipFill>
           <p:spPr bwMode="auto">
             <a:xfrm>
-              <a:off x="6858000" y="2291679"/>
+              <a:off x="7257382" y="4354570"/>
               <a:ext cx="381000" cy="381000"/>
             </a:xfrm>
             <a:prstGeom prst="rect">
@@ -4025,7 +4025,7 @@
           </p:nvSpPr>
           <p:spPr bwMode="auto">
             <a:xfrm>
-              <a:off x="5926932" y="2706707"/>
+              <a:off x="6323134" y="4774582"/>
               <a:ext cx="2243137" cy="276999"/>
             </a:xfrm>
             <a:prstGeom prst="rect">
@@ -4165,7 +4165,7 @@
                   <a:ea typeface="Amazon Ember" panose="020B0603020204020204" pitchFamily="34" charset="0"/>
                   <a:cs typeface="Arial" panose="020B0604020202020204" pitchFamily="34" charset="0"/>
                 </a:rPr>
-                <a:t>Amazon API Gateway</a:t>
+                <a:t>AWS AppSync</a:t>
               </a:r>
             </a:p>
           </p:txBody>
@@ -5951,8 +5951,8 @@
         </p:nvSpPr>
         <p:spPr bwMode="auto">
           <a:xfrm>
-            <a:off x="5514867" y="4335588"/>
-            <a:ext cx="1042937" cy="438994"/>
+            <a:off x="5604406" y="4335588"/>
+            <a:ext cx="847227" cy="438994"/>
           </a:xfrm>
           <a:prstGeom prst="rect">
             <a:avLst/>
@@ -6074,7 +6074,7 @@
                 <a:ea typeface="Amazon Ember" panose="020B0603020204020204" pitchFamily="34" charset="0"/>
                 <a:cs typeface="Arial" panose="020B0604020202020204" pitchFamily="34" charset="0"/>
               </a:rPr>
-              <a:t>websocket</a:t>
+              <a:t>GraphQL</a:t>
             </a:r>
             <a:r>
               <a:rPr lang="en-US" altLang="en-US" sz="1200" dirty="0">
@@ -6082,7 +6082,7 @@
                 <a:ea typeface="Amazon Ember" panose="020B0603020204020204" pitchFamily="34" charset="0"/>
                 <a:cs typeface="Arial" panose="020B0604020202020204" pitchFamily="34" charset="0"/>
               </a:rPr>
-              <a:t> communication</a:t>
+              <a:t> integration</a:t>
             </a:r>
           </a:p>
         </p:txBody>

</xml_diff>